<commit_message>
added lead figure, and kilobot angle of repose section
</commit_message>
<xml_diff>
--- a/ICRA19/pictures/pdf/Angle.pptx
+++ b/ICRA19/pictures/pdf/Angle.pptx
@@ -243,7 +243,7 @@
           <a:p>
             <a:fld id="{9578BA41-4624-3049-9962-89A9624110BB}" type="datetimeFigureOut">
               <a:rPr lang="en-US" smtClean="0"/>
-              <a:t>8/17/18</a:t>
+              <a:t>9/10/18</a:t>
             </a:fld>
             <a:endParaRPr lang="en-US"/>
           </a:p>
@@ -413,7 +413,7 @@
           <a:p>
             <a:fld id="{9578BA41-4624-3049-9962-89A9624110BB}" type="datetimeFigureOut">
               <a:rPr lang="en-US" smtClean="0"/>
-              <a:t>8/17/18</a:t>
+              <a:t>9/10/18</a:t>
             </a:fld>
             <a:endParaRPr lang="en-US"/>
           </a:p>
@@ -593,7 +593,7 @@
           <a:p>
             <a:fld id="{9578BA41-4624-3049-9962-89A9624110BB}" type="datetimeFigureOut">
               <a:rPr lang="en-US" smtClean="0"/>
-              <a:t>8/17/18</a:t>
+              <a:t>9/10/18</a:t>
             </a:fld>
             <a:endParaRPr lang="en-US"/>
           </a:p>
@@ -763,7 +763,7 @@
           <a:p>
             <a:fld id="{9578BA41-4624-3049-9962-89A9624110BB}" type="datetimeFigureOut">
               <a:rPr lang="en-US" smtClean="0"/>
-              <a:t>8/17/18</a:t>
+              <a:t>9/10/18</a:t>
             </a:fld>
             <a:endParaRPr lang="en-US"/>
           </a:p>
@@ -1009,7 +1009,7 @@
           <a:p>
             <a:fld id="{9578BA41-4624-3049-9962-89A9624110BB}" type="datetimeFigureOut">
               <a:rPr lang="en-US" smtClean="0"/>
-              <a:t>8/17/18</a:t>
+              <a:t>9/10/18</a:t>
             </a:fld>
             <a:endParaRPr lang="en-US"/>
           </a:p>
@@ -1241,7 +1241,7 @@
           <a:p>
             <a:fld id="{9578BA41-4624-3049-9962-89A9624110BB}" type="datetimeFigureOut">
               <a:rPr lang="en-US" smtClean="0"/>
-              <a:t>8/17/18</a:t>
+              <a:t>9/10/18</a:t>
             </a:fld>
             <a:endParaRPr lang="en-US"/>
           </a:p>
@@ -1608,7 +1608,7 @@
           <a:p>
             <a:fld id="{9578BA41-4624-3049-9962-89A9624110BB}" type="datetimeFigureOut">
               <a:rPr lang="en-US" smtClean="0"/>
-              <a:t>8/17/18</a:t>
+              <a:t>9/10/18</a:t>
             </a:fld>
             <a:endParaRPr lang="en-US"/>
           </a:p>
@@ -1726,7 +1726,7 @@
           <a:p>
             <a:fld id="{9578BA41-4624-3049-9962-89A9624110BB}" type="datetimeFigureOut">
               <a:rPr lang="en-US" smtClean="0"/>
-              <a:t>8/17/18</a:t>
+              <a:t>9/10/18</a:t>
             </a:fld>
             <a:endParaRPr lang="en-US"/>
           </a:p>
@@ -1821,7 +1821,7 @@
           <a:p>
             <a:fld id="{9578BA41-4624-3049-9962-89A9624110BB}" type="datetimeFigureOut">
               <a:rPr lang="en-US" smtClean="0"/>
-              <a:t>8/17/18</a:t>
+              <a:t>9/10/18</a:t>
             </a:fld>
             <a:endParaRPr lang="en-US"/>
           </a:p>
@@ -2098,7 +2098,7 @@
           <a:p>
             <a:fld id="{9578BA41-4624-3049-9962-89A9624110BB}" type="datetimeFigureOut">
               <a:rPr lang="en-US" smtClean="0"/>
-              <a:t>8/17/18</a:t>
+              <a:t>9/10/18</a:t>
             </a:fld>
             <a:endParaRPr lang="en-US"/>
           </a:p>
@@ -2355,7 +2355,7 @@
           <a:p>
             <a:fld id="{9578BA41-4624-3049-9962-89A9624110BB}" type="datetimeFigureOut">
               <a:rPr lang="en-US" smtClean="0"/>
-              <a:t>8/17/18</a:t>
+              <a:t>9/10/18</a:t>
             </a:fld>
             <a:endParaRPr lang="en-US"/>
           </a:p>
@@ -2568,7 +2568,7 @@
           <a:p>
             <a:fld id="{9578BA41-4624-3049-9962-89A9624110BB}" type="datetimeFigureOut">
               <a:rPr lang="en-US" smtClean="0"/>
-              <a:t>8/17/18</a:t>
+              <a:t>9/10/18</a:t>
             </a:fld>
             <a:endParaRPr lang="en-US"/>
           </a:p>
@@ -2975,6 +2975,36 @@
       </p:grpSpPr>
       <p:pic>
         <p:nvPicPr>
+          <p:cNvPr id="8" name="Picture 7">
+            <a:extLst>
+              <a:ext uri="{FF2B5EF4-FFF2-40B4-BE49-F238E27FC236}">
+                <a16:creationId xmlns:a16="http://schemas.microsoft.com/office/drawing/2014/main" id="{D5B618BE-77BC-8C40-B660-56A28D240E56}"/>
+              </a:ext>
+            </a:extLst>
+          </p:cNvPr>
+          <p:cNvPicPr>
+            <a:picLocks noChangeAspect="1"/>
+          </p:cNvPicPr>
+          <p:nvPr/>
+        </p:nvPicPr>
+        <p:blipFill>
+          <a:blip r:embed="rId2"/>
+          <a:stretch>
+            <a:fillRect/>
+          </a:stretch>
+        </p:blipFill>
+        <p:spPr>
+          <a:xfrm>
+            <a:off x="2525276" y="701152"/>
+            <a:ext cx="1032253" cy="1127538"/>
+          </a:xfrm>
+          <a:prstGeom prst="rect">
+            <a:avLst/>
+          </a:prstGeom>
+        </p:spPr>
+      </p:pic>
+      <p:pic>
+        <p:nvPicPr>
           <p:cNvPr id="7" name="Picture 6">
             <a:extLst>
               <a:ext uri="{FF2B5EF4-FFF2-40B4-BE49-F238E27FC236}">
@@ -2988,7 +3018,7 @@
           <p:nvPr/>
         </p:nvPicPr>
         <p:blipFill rotWithShape="1">
-          <a:blip r:embed="rId2"/>
+          <a:blip r:embed="rId3"/>
           <a:srcRect l="53328" t="34040" r="29823" b="50007"/>
           <a:stretch/>
         </p:blipFill>
@@ -3017,7 +3047,7 @@
           <p:nvPr/>
         </p:nvPicPr>
         <p:blipFill rotWithShape="1">
-          <a:blip r:embed="rId2"/>
+          <a:blip r:embed="rId3"/>
           <a:srcRect l="53289" t="53094" r="32168" b="33967"/>
           <a:stretch/>
         </p:blipFill>
@@ -3025,35 +3055,6 @@
           <a:xfrm>
             <a:off x="-135627" y="1140639"/>
             <a:ext cx="1317577" cy="732611"/>
-          </a:xfrm>
-          <a:prstGeom prst="rect">
-            <a:avLst/>
-          </a:prstGeom>
-        </p:spPr>
-      </p:pic>
-      <p:pic>
-        <p:nvPicPr>
-          <p:cNvPr id="12" name="Picture 11">
-            <a:extLst>
-              <a:ext uri="{FF2B5EF4-FFF2-40B4-BE49-F238E27FC236}">
-                <a16:creationId xmlns:a16="http://schemas.microsoft.com/office/drawing/2014/main" id="{048054AE-AF09-7749-B4F9-69E4BA20FB8C}"/>
-              </a:ext>
-            </a:extLst>
-          </p:cNvPr>
-          <p:cNvPicPr>
-            <a:picLocks noChangeAspect="1"/>
-          </p:cNvPicPr>
-          <p:nvPr/>
-        </p:nvPicPr>
-        <p:blipFill rotWithShape="1">
-          <a:blip r:embed="rId2"/>
-          <a:srcRect l="53867" t="10417" r="31759" b="65558"/>
-          <a:stretch/>
-        </p:blipFill>
-        <p:spPr>
-          <a:xfrm>
-            <a:off x="2366863" y="493346"/>
-            <a:ext cx="1279604" cy="1336693"/>
           </a:xfrm>
           <a:prstGeom prst="rect">
             <a:avLst/>
@@ -3082,7 +3083,7 @@
           <a:prstGeom prst="line">
             <a:avLst/>
           </a:prstGeom>
-          <a:ln w="12700"/>
+          <a:ln w="9525"/>
         </p:spPr>
         <p:style>
           <a:lnRef idx="1">
@@ -3121,7 +3122,7 @@
           <a:prstGeom prst="line">
             <a:avLst/>
           </a:prstGeom>
-          <a:ln w="12700"/>
+          <a:ln w="9525"/>
         </p:spPr>
         <p:style>
           <a:lnRef idx="1">
@@ -3161,7 +3162,7 @@
               <a:gd name="adj2" fmla="val 15472972"/>
             </a:avLst>
           </a:prstGeom>
-          <a:ln w="12700"/>
+          <a:ln w="9525"/>
         </p:spPr>
         <p:style>
           <a:lnRef idx="1">
@@ -3241,7 +3242,7 @@
           <a:prstGeom prst="line">
             <a:avLst/>
           </a:prstGeom>
-          <a:ln w="12700"/>
+          <a:ln w="9525"/>
         </p:spPr>
         <p:style>
           <a:lnRef idx="1">
@@ -3280,7 +3281,7 @@
           <a:prstGeom prst="line">
             <a:avLst/>
           </a:prstGeom>
-          <a:ln w="12700"/>
+          <a:ln w="9525"/>
         </p:spPr>
         <p:style>
           <a:lnRef idx="1">
@@ -3320,7 +3321,7 @@
               <a:gd name="adj2" fmla="val 15400295"/>
             </a:avLst>
           </a:prstGeom>
-          <a:ln w="12700"/>
+          <a:ln w="9525"/>
         </p:spPr>
         <p:style>
           <a:lnRef idx="1">
@@ -3396,13 +3397,13 @@
         </p:nvCxnSpPr>
         <p:spPr>
           <a:xfrm flipV="1">
-            <a:off x="3011257" y="1430307"/>
+            <a:off x="3011257" y="1493807"/>
             <a:ext cx="244680" cy="86215"/>
           </a:xfrm>
           <a:prstGeom prst="line">
             <a:avLst/>
           </a:prstGeom>
-          <a:ln w="12700"/>
+          <a:ln w="9525"/>
         </p:spPr>
         <p:style>
           <a:lnRef idx="1">
@@ -6909,7 +6910,7 @@
           <a:prstGeom prst="line">
             <a:avLst/>
           </a:prstGeom>
-          <a:ln w="12700"/>
+          <a:ln w="9525"/>
         </p:spPr>
         <p:style>
           <a:lnRef idx="1">
@@ -6948,7 +6949,7 @@
           <a:prstGeom prst="line">
             <a:avLst/>
           </a:prstGeom>
-          <a:ln w="12700"/>
+          <a:ln w="9525"/>
         </p:spPr>
         <p:style>
           <a:lnRef idx="1">
@@ -6988,7 +6989,7 @@
               <a:gd name="adj2" fmla="val 3093099"/>
             </a:avLst>
           </a:prstGeom>
-          <a:ln w="12700"/>
+          <a:ln w="9525"/>
         </p:spPr>
         <p:style>
           <a:lnRef idx="1">
@@ -7027,7 +7028,7 @@
         </p:nvSpPr>
         <p:spPr>
           <a:xfrm>
-            <a:off x="1350964" y="1476075"/>
+            <a:off x="1353704" y="1463471"/>
             <a:ext cx="220005" cy="246221"/>
           </a:xfrm>
           <a:prstGeom prst="rect">
@@ -7070,7 +7071,7 @@
           <a:prstGeom prst="line">
             <a:avLst/>
           </a:prstGeom>
-          <a:ln w="12700"/>
+          <a:ln w="9525"/>
         </p:spPr>
         <p:style>
           <a:lnRef idx="1">
@@ -7109,7 +7110,7 @@
           <a:prstGeom prst="line">
             <a:avLst/>
           </a:prstGeom>
-          <a:ln w="12700"/>
+          <a:ln w="9525"/>
         </p:spPr>
         <p:style>
           <a:lnRef idx="1">
@@ -7149,7 +7150,7 @@
               <a:gd name="adj2" fmla="val 1690582"/>
             </a:avLst>
           </a:prstGeom>
-          <a:ln w="12700"/>
+          <a:ln w="9525"/>
         </p:spPr>
         <p:style>
           <a:lnRef idx="1">
@@ -7188,7 +7189,7 @@
         </p:nvSpPr>
         <p:spPr>
           <a:xfrm>
-            <a:off x="158282" y="1472030"/>
+            <a:off x="124399" y="1493176"/>
             <a:ext cx="220005" cy="246221"/>
           </a:xfrm>
           <a:prstGeom prst="rect">
@@ -7225,13 +7226,13 @@
         </p:nvCxnSpPr>
         <p:spPr>
           <a:xfrm flipV="1">
-            <a:off x="3010388" y="1516522"/>
+            <a:off x="3010388" y="1580022"/>
             <a:ext cx="266222" cy="2335"/>
           </a:xfrm>
           <a:prstGeom prst="line">
             <a:avLst/>
           </a:prstGeom>
-          <a:ln w="12700"/>
+          <a:ln w="9525"/>
         </p:spPr>
         <p:style>
           <a:lnRef idx="1">
@@ -7264,7 +7265,7 @@
             </p:nvSpPr>
             <p:spPr>
               <a:xfrm>
-                <a:off x="3196689" y="1320884"/>
+                <a:off x="3196689" y="1352634"/>
                 <a:ext cx="220005" cy="246221"/>
               </a:xfrm>
               <a:prstGeom prst="rect">
@@ -7317,14 +7318,14 @@
             </p:nvSpPr>
             <p:spPr>
               <a:xfrm>
-                <a:off x="3196689" y="1320884"/>
+                <a:off x="3196689" y="1352634"/>
                 <a:ext cx="220005" cy="246221"/>
               </a:xfrm>
               <a:prstGeom prst="rect">
                 <a:avLst/>
               </a:prstGeom>
               <a:blipFill>
-                <a:blip r:embed="rId3"/>
+                <a:blip r:embed="rId4"/>
                 <a:stretch>
                   <a:fillRect/>
                 </a:stretch>
@@ -7359,7 +7360,7 @@
         </p:nvSpPr>
         <p:spPr>
           <a:xfrm rot="19556421">
-            <a:off x="2849454" y="1372108"/>
+            <a:off x="2849454" y="1441958"/>
             <a:ext cx="307510" cy="300915"/>
           </a:xfrm>
           <a:prstGeom prst="arc">
@@ -7368,7 +7369,7 @@
               <a:gd name="adj2" fmla="val 1954288"/>
             </a:avLst>
           </a:prstGeom>
-          <a:ln w="12700"/>
+          <a:ln w="9525"/>
         </p:spPr>
         <p:style>
           <a:lnRef idx="1">
@@ -7531,9 +7532,9 @@
           <p:nvPr/>
         </p:nvSpPr>
         <p:spPr>
-          <a:xfrm rot="19994382">
-            <a:off x="2680006" y="1373175"/>
-            <a:ext cx="187703" cy="246221"/>
+          <a:xfrm rot="19994382" flipV="1">
+            <a:off x="2789235" y="1564475"/>
+            <a:ext cx="69017" cy="45719"/>
           </a:xfrm>
           <a:prstGeom prst="rect">
             <a:avLst/>
@@ -7549,58 +7550,6 @@
           <a:lstStyle/>
           <a:p>
             <a:endParaRPr lang="en-US" sz="1000" i="1" dirty="0"/>
-          </a:p>
-        </p:txBody>
-      </p:sp>
-      <p:sp>
-        <p:nvSpPr>
-          <p:cNvPr id="24" name="Rectangle 23">
-            <a:extLst>
-              <a:ext uri="{FF2B5EF4-FFF2-40B4-BE49-F238E27FC236}">
-                <a16:creationId xmlns:a16="http://schemas.microsoft.com/office/drawing/2014/main" id="{96A0F1FE-70AE-064B-95C1-FF51DCA5B039}"/>
-              </a:ext>
-            </a:extLst>
-          </p:cNvPr>
-          <p:cNvSpPr/>
-          <p:nvPr/>
-        </p:nvSpPr>
-        <p:spPr>
-          <a:xfrm rot="20222179">
-            <a:off x="2732658" y="1584161"/>
-            <a:ext cx="257439" cy="90020"/>
-          </a:xfrm>
-          <a:prstGeom prst="rect">
-            <a:avLst/>
-          </a:prstGeom>
-          <a:solidFill>
-            <a:srgbClr val="FF8080"/>
-          </a:solidFill>
-          <a:ln>
-            <a:noFill/>
-          </a:ln>
-        </p:spPr>
-        <p:style>
-          <a:lnRef idx="2">
-            <a:schemeClr val="accent1">
-              <a:shade val="50000"/>
-            </a:schemeClr>
-          </a:lnRef>
-          <a:fillRef idx="1">
-            <a:schemeClr val="accent1"/>
-          </a:fillRef>
-          <a:effectRef idx="0">
-            <a:schemeClr val="accent1"/>
-          </a:effectRef>
-          <a:fontRef idx="minor">
-            <a:schemeClr val="lt1"/>
-          </a:fontRef>
-        </p:style>
-        <p:txBody>
-          <a:bodyPr rtlCol="0" anchor="ctr"/>
-          <a:lstStyle/>
-          <a:p>
-            <a:pPr algn="ctr"/>
-            <a:endParaRPr lang="en-US"/>
           </a:p>
         </p:txBody>
       </p:sp>
@@ -7618,7 +7567,7 @@
         </p:nvSpPr>
         <p:spPr>
           <a:xfrm>
-            <a:off x="2564973" y="1446857"/>
+            <a:off x="2621352" y="1448072"/>
             <a:ext cx="220005" cy="246221"/>
           </a:xfrm>
           <a:prstGeom prst="rect">
@@ -7725,6 +7674,40 @@
           </a:fontRef>
         </p:style>
       </p:cxnSp>
+      <p:sp>
+        <p:nvSpPr>
+          <p:cNvPr id="141" name="TextBox 140">
+            <a:extLst>
+              <a:ext uri="{FF2B5EF4-FFF2-40B4-BE49-F238E27FC236}">
+                <a16:creationId xmlns:a16="http://schemas.microsoft.com/office/drawing/2014/main" id="{9E645CF3-62A0-9E43-BFC3-09BBE364434A}"/>
+              </a:ext>
+            </a:extLst>
+          </p:cNvPr>
+          <p:cNvSpPr txBox="1"/>
+          <p:nvPr/>
+        </p:nvSpPr>
+        <p:spPr>
+          <a:xfrm rot="19994382" flipV="1">
+            <a:off x="2808483" y="1605808"/>
+            <a:ext cx="69017" cy="45719"/>
+          </a:xfrm>
+          <a:prstGeom prst="rect">
+            <a:avLst/>
+          </a:prstGeom>
+          <a:solidFill>
+            <a:srgbClr val="FF8080"/>
+          </a:solidFill>
+        </p:spPr>
+        <p:txBody>
+          <a:bodyPr wrap="square" rtlCol="0">
+            <a:spAutoFit/>
+          </a:bodyPr>
+          <a:lstStyle/>
+          <a:p>
+            <a:endParaRPr lang="en-US" sz="1000" i="1" dirty="0"/>
+          </a:p>
+        </p:txBody>
+      </p:sp>
     </p:spTree>
     <p:extLst>
       <p:ext uri="{BB962C8B-B14F-4D97-AF65-F5344CB8AC3E}">

</xml_diff>

<commit_message>
added new fig 2 in powerpoint
</commit_message>
<xml_diff>
--- a/ICRA19/pictures/pdf/Angle.pptx
+++ b/ICRA19/pictures/pdf/Angle.pptx
@@ -2975,10 +2975,10 @@
       </p:grpSpPr>
       <p:pic>
         <p:nvPicPr>
-          <p:cNvPr id="8" name="Picture 7">
+          <p:cNvPr id="13" name="Picture 12">
             <a:extLst>
               <a:ext uri="{FF2B5EF4-FFF2-40B4-BE49-F238E27FC236}">
-                <a16:creationId xmlns:a16="http://schemas.microsoft.com/office/drawing/2014/main" id="{D5B618BE-77BC-8C40-B660-56A28D240E56}"/>
+                <a16:creationId xmlns:a16="http://schemas.microsoft.com/office/drawing/2014/main" id="{00437FA7-22E4-B64A-9C8B-8B3EBB8AB1B1}"/>
               </a:ext>
             </a:extLst>
           </p:cNvPr>
@@ -2994,9 +2994,9 @@
           </a:stretch>
         </p:blipFill>
         <p:spPr>
-          <a:xfrm>
-            <a:off x="2525276" y="701152"/>
-            <a:ext cx="1032253" cy="1127538"/>
+          <a:xfrm flipH="1">
+            <a:off x="2449852" y="656815"/>
+            <a:ext cx="1125107" cy="1171986"/>
           </a:xfrm>
           <a:prstGeom prst="rect">
             <a:avLst/>
@@ -3083,7 +3083,7 @@
           <a:prstGeom prst="line">
             <a:avLst/>
           </a:prstGeom>
-          <a:ln w="9525"/>
+          <a:ln w="6350"/>
         </p:spPr>
         <p:style>
           <a:lnRef idx="1">
@@ -3122,7 +3122,7 @@
           <a:prstGeom prst="line">
             <a:avLst/>
           </a:prstGeom>
-          <a:ln w="9525"/>
+          <a:ln w="6350"/>
         </p:spPr>
         <p:style>
           <a:lnRef idx="1">
@@ -3162,7 +3162,7 @@
               <a:gd name="adj2" fmla="val 15472972"/>
             </a:avLst>
           </a:prstGeom>
-          <a:ln w="9525"/>
+          <a:ln w="6350"/>
         </p:spPr>
         <p:style>
           <a:lnRef idx="1">
@@ -3242,7 +3242,7 @@
           <a:prstGeom prst="line">
             <a:avLst/>
           </a:prstGeom>
-          <a:ln w="9525"/>
+          <a:ln w="6350"/>
         </p:spPr>
         <p:style>
           <a:lnRef idx="1">
@@ -3281,7 +3281,7 @@
           <a:prstGeom prst="line">
             <a:avLst/>
           </a:prstGeom>
-          <a:ln w="9525"/>
+          <a:ln w="6350"/>
         </p:spPr>
         <p:style>
           <a:lnRef idx="1">
@@ -3321,7 +3321,7 @@
               <a:gd name="adj2" fmla="val 15400295"/>
             </a:avLst>
           </a:prstGeom>
-          <a:ln w="9525"/>
+          <a:ln w="6350"/>
         </p:spPr>
         <p:style>
           <a:lnRef idx="1">
@@ -3403,7 +3403,7 @@
           <a:prstGeom prst="line">
             <a:avLst/>
           </a:prstGeom>
-          <a:ln w="9525"/>
+          <a:ln w="6350"/>
         </p:spPr>
         <p:style>
           <a:lnRef idx="1">
@@ -6910,7 +6910,7 @@
           <a:prstGeom prst="line">
             <a:avLst/>
           </a:prstGeom>
-          <a:ln w="9525"/>
+          <a:ln w="6350"/>
         </p:spPr>
         <p:style>
           <a:lnRef idx="1">
@@ -6949,7 +6949,7 @@
           <a:prstGeom prst="line">
             <a:avLst/>
           </a:prstGeom>
-          <a:ln w="9525"/>
+          <a:ln w="6350"/>
         </p:spPr>
         <p:style>
           <a:lnRef idx="1">
@@ -6980,7 +6980,7 @@
         </p:nvSpPr>
         <p:spPr>
           <a:xfrm rot="19556421">
-            <a:off x="1106479" y="1542622"/>
+            <a:off x="1106479" y="1535450"/>
             <a:ext cx="307510" cy="300915"/>
           </a:xfrm>
           <a:prstGeom prst="arc">
@@ -6989,7 +6989,7 @@
               <a:gd name="adj2" fmla="val 3093099"/>
             </a:avLst>
           </a:prstGeom>
-          <a:ln w="9525"/>
+          <a:ln w="6350"/>
         </p:spPr>
         <p:style>
           <a:lnRef idx="1">
@@ -7028,7 +7028,7 @@
         </p:nvSpPr>
         <p:spPr>
           <a:xfrm>
-            <a:off x="1353704" y="1463471"/>
+            <a:off x="1339701" y="1481122"/>
             <a:ext cx="220005" cy="246221"/>
           </a:xfrm>
           <a:prstGeom prst="rect">
@@ -7071,7 +7071,7 @@
           <a:prstGeom prst="line">
             <a:avLst/>
           </a:prstGeom>
-          <a:ln w="9525"/>
+          <a:ln w="6350"/>
         </p:spPr>
         <p:style>
           <a:lnRef idx="1">
@@ -7110,7 +7110,7 @@
           <a:prstGeom prst="line">
             <a:avLst/>
           </a:prstGeom>
-          <a:ln w="9525"/>
+          <a:ln w="6350"/>
         </p:spPr>
         <p:style>
           <a:lnRef idx="1">
@@ -7150,7 +7150,7 @@
               <a:gd name="adj2" fmla="val 1690582"/>
             </a:avLst>
           </a:prstGeom>
-          <a:ln w="9525"/>
+          <a:ln w="6350"/>
         </p:spPr>
         <p:style>
           <a:lnRef idx="1">
@@ -7189,7 +7189,7 @@
         </p:nvSpPr>
         <p:spPr>
           <a:xfrm>
-            <a:off x="124399" y="1493176"/>
+            <a:off x="197062" y="1456911"/>
             <a:ext cx="220005" cy="246221"/>
           </a:xfrm>
           <a:prstGeom prst="rect">
@@ -7232,7 +7232,7 @@
           <a:prstGeom prst="line">
             <a:avLst/>
           </a:prstGeom>
-          <a:ln w="9525"/>
+          <a:ln w="6350"/>
         </p:spPr>
         <p:style>
           <a:lnRef idx="1">
@@ -7369,7 +7369,7 @@
               <a:gd name="adj2" fmla="val 1954288"/>
             </a:avLst>
           </a:prstGeom>
-          <a:ln w="9525"/>
+          <a:ln w="6350"/>
         </p:spPr>
         <p:style>
           <a:lnRef idx="1">
@@ -7484,112 +7484,6 @@
       </p:cxnSp>
       <p:sp>
         <p:nvSpPr>
-          <p:cNvPr id="135" name="TextBox 134">
-            <a:extLst>
-              <a:ext uri="{FF2B5EF4-FFF2-40B4-BE49-F238E27FC236}">
-                <a16:creationId xmlns:a16="http://schemas.microsoft.com/office/drawing/2014/main" id="{1C71811F-F8EF-C54A-B749-A34C4569D727}"/>
-              </a:ext>
-            </a:extLst>
-          </p:cNvPr>
-          <p:cNvSpPr txBox="1"/>
-          <p:nvPr/>
-        </p:nvSpPr>
-        <p:spPr>
-          <a:xfrm>
-            <a:off x="3150289" y="1025539"/>
-            <a:ext cx="165695" cy="246221"/>
-          </a:xfrm>
-          <a:prstGeom prst="rect">
-            <a:avLst/>
-          </a:prstGeom>
-          <a:solidFill>
-            <a:srgbClr val="EB6235"/>
-          </a:solidFill>
-        </p:spPr>
-        <p:txBody>
-          <a:bodyPr wrap="square" rtlCol="0">
-            <a:spAutoFit/>
-          </a:bodyPr>
-          <a:lstStyle/>
-          <a:p>
-            <a:r>
-              <a:rPr lang="en-US" sz="1000" i="1" dirty="0"/>
-              <a:t>⍺</a:t>
-            </a:r>
-          </a:p>
-        </p:txBody>
-      </p:sp>
-      <p:sp>
-        <p:nvSpPr>
-          <p:cNvPr id="136" name="TextBox 135">
-            <a:extLst>
-              <a:ext uri="{FF2B5EF4-FFF2-40B4-BE49-F238E27FC236}">
-                <a16:creationId xmlns:a16="http://schemas.microsoft.com/office/drawing/2014/main" id="{2B240D6D-5424-124B-841D-32532470444C}"/>
-              </a:ext>
-            </a:extLst>
-          </p:cNvPr>
-          <p:cNvSpPr txBox="1"/>
-          <p:nvPr/>
-        </p:nvSpPr>
-        <p:spPr>
-          <a:xfrm rot="19994382" flipV="1">
-            <a:off x="2789235" y="1564475"/>
-            <a:ext cx="69017" cy="45719"/>
-          </a:xfrm>
-          <a:prstGeom prst="rect">
-            <a:avLst/>
-          </a:prstGeom>
-          <a:solidFill>
-            <a:srgbClr val="EB6235"/>
-          </a:solidFill>
-        </p:spPr>
-        <p:txBody>
-          <a:bodyPr wrap="square" rtlCol="0">
-            <a:spAutoFit/>
-          </a:bodyPr>
-          <a:lstStyle/>
-          <a:p>
-            <a:endParaRPr lang="en-US" sz="1000" i="1" dirty="0"/>
-          </a:p>
-        </p:txBody>
-      </p:sp>
-      <p:sp>
-        <p:nvSpPr>
-          <p:cNvPr id="138" name="TextBox 137">
-            <a:extLst>
-              <a:ext uri="{FF2B5EF4-FFF2-40B4-BE49-F238E27FC236}">
-                <a16:creationId xmlns:a16="http://schemas.microsoft.com/office/drawing/2014/main" id="{1AA24352-911C-064F-B3EF-B0A9E03BC4FC}"/>
-              </a:ext>
-            </a:extLst>
-          </p:cNvPr>
-          <p:cNvSpPr txBox="1"/>
-          <p:nvPr/>
-        </p:nvSpPr>
-        <p:spPr>
-          <a:xfrm>
-            <a:off x="2621352" y="1448072"/>
-            <a:ext cx="220005" cy="246221"/>
-          </a:xfrm>
-          <a:prstGeom prst="rect">
-            <a:avLst/>
-          </a:prstGeom>
-          <a:noFill/>
-        </p:spPr>
-        <p:txBody>
-          <a:bodyPr wrap="square" rtlCol="0">
-            <a:spAutoFit/>
-          </a:bodyPr>
-          <a:lstStyle/>
-          <a:p>
-            <a:r>
-              <a:rPr lang="en-US" sz="1000" i="1" dirty="0"/>
-              <a:t>⍺</a:t>
-            </a:r>
-          </a:p>
-        </p:txBody>
-      </p:sp>
-      <p:sp>
-        <p:nvSpPr>
           <p:cNvPr id="129" name="TextBox 128">
             <a:extLst>
               <a:ext uri="{FF2B5EF4-FFF2-40B4-BE49-F238E27FC236}">
@@ -7674,12 +7568,536 @@
           </a:fontRef>
         </p:style>
       </p:cxnSp>
+      <p:cxnSp>
+        <p:nvCxnSpPr>
+          <p:cNvPr id="142" name="Straight Connector 141">
+            <a:extLst>
+              <a:ext uri="{FF2B5EF4-FFF2-40B4-BE49-F238E27FC236}">
+                <a16:creationId xmlns:a16="http://schemas.microsoft.com/office/drawing/2014/main" id="{89757DA0-F6B7-FA4B-B505-59DF5786FD8A}"/>
+              </a:ext>
+            </a:extLst>
+          </p:cNvPr>
+          <p:cNvCxnSpPr>
+            <a:cxnSpLocks/>
+          </p:cNvCxnSpPr>
+          <p:nvPr/>
+        </p:nvCxnSpPr>
+        <p:spPr>
+          <a:xfrm flipV="1">
+            <a:off x="1775904" y="1488425"/>
+            <a:ext cx="244680" cy="86215"/>
+          </a:xfrm>
+          <a:prstGeom prst="line">
+            <a:avLst/>
+          </a:prstGeom>
+          <a:ln w="6350"/>
+        </p:spPr>
+        <p:style>
+          <a:lnRef idx="1">
+            <a:schemeClr val="dk1"/>
+          </a:lnRef>
+          <a:fillRef idx="0">
+            <a:schemeClr val="dk1"/>
+          </a:fillRef>
+          <a:effectRef idx="0">
+            <a:schemeClr val="dk1"/>
+          </a:effectRef>
+          <a:fontRef idx="minor">
+            <a:schemeClr val="tx1"/>
+          </a:fontRef>
+        </p:style>
+      </p:cxnSp>
+      <p:cxnSp>
+        <p:nvCxnSpPr>
+          <p:cNvPr id="144" name="Straight Connector 143">
+            <a:extLst>
+              <a:ext uri="{FF2B5EF4-FFF2-40B4-BE49-F238E27FC236}">
+                <a16:creationId xmlns:a16="http://schemas.microsoft.com/office/drawing/2014/main" id="{4227C927-45FD-1A48-81E6-7D45781EEEEB}"/>
+              </a:ext>
+            </a:extLst>
+          </p:cNvPr>
+          <p:cNvCxnSpPr>
+            <a:cxnSpLocks/>
+          </p:cNvCxnSpPr>
+          <p:nvPr/>
+        </p:nvCxnSpPr>
+        <p:spPr>
+          <a:xfrm flipV="1">
+            <a:off x="1775035" y="1578226"/>
+            <a:ext cx="266222" cy="2335"/>
+          </a:xfrm>
+          <a:prstGeom prst="line">
+            <a:avLst/>
+          </a:prstGeom>
+          <a:ln w="6350"/>
+        </p:spPr>
+        <p:style>
+          <a:lnRef idx="1">
+            <a:schemeClr val="dk1"/>
+          </a:lnRef>
+          <a:fillRef idx="0">
+            <a:schemeClr val="dk1"/>
+          </a:fillRef>
+          <a:effectRef idx="0">
+            <a:schemeClr val="dk1"/>
+          </a:effectRef>
+          <a:fontRef idx="minor">
+            <a:schemeClr val="tx1"/>
+          </a:fontRef>
+        </p:style>
+      </p:cxnSp>
+      <mc:AlternateContent xmlns:mc="http://schemas.openxmlformats.org/markup-compatibility/2006">
+        <mc:Choice xmlns:a14="http://schemas.microsoft.com/office/drawing/2010/main" Requires="a14">
+          <p:sp>
+            <p:nvSpPr>
+              <p:cNvPr id="145" name="TextBox 144">
+                <a:extLst>
+                  <a:ext uri="{FF2B5EF4-FFF2-40B4-BE49-F238E27FC236}">
+                    <a16:creationId xmlns:a16="http://schemas.microsoft.com/office/drawing/2014/main" id="{40D142AF-627E-1C48-93C1-C286E0264E86}"/>
+                  </a:ext>
+                </a:extLst>
+              </p:cNvPr>
+              <p:cNvSpPr txBox="1"/>
+              <p:nvPr/>
+            </p:nvSpPr>
+            <p:spPr>
+              <a:xfrm>
+                <a:off x="1975691" y="1339953"/>
+                <a:ext cx="220005" cy="246221"/>
+              </a:xfrm>
+              <a:prstGeom prst="rect">
+                <a:avLst/>
+              </a:prstGeom>
+              <a:noFill/>
+            </p:spPr>
+            <p:txBody>
+              <a:bodyPr wrap="square" rtlCol="0">
+                <a:spAutoFit/>
+              </a:bodyPr>
+              <a:lstStyle/>
+              <a:p>
+                <a:pPr/>
+                <a14:m>
+                  <m:oMathPara xmlns:m="http://schemas.openxmlformats.org/officeDocument/2006/math">
+                    <m:oMathParaPr>
+                      <m:jc m:val="centerGroup"/>
+                    </m:oMathParaPr>
+                    <m:oMath xmlns:m="http://schemas.openxmlformats.org/officeDocument/2006/math">
+                      <m:r>
+                        <a:rPr lang="en-US" sz="1000" i="1" dirty="0" smtClean="0">
+                          <a:latin typeface="Cambria Math" panose="02040503050406030204" pitchFamily="18" charset="0"/>
+                          <a:ea typeface="Cambria Math" panose="02040503050406030204" pitchFamily="18" charset="0"/>
+                        </a:rPr>
+                        <m:t>𝜃</m:t>
+                      </m:r>
+                    </m:oMath>
+                  </m:oMathPara>
+                </a14:m>
+                <a:endParaRPr lang="en-US" sz="1000" i="1" dirty="0"/>
+              </a:p>
+            </p:txBody>
+          </p:sp>
+        </mc:Choice>
+        <mc:Fallback>
+          <p:sp>
+            <p:nvSpPr>
+              <p:cNvPr id="145" name="TextBox 144">
+                <a:extLst>
+                  <a:ext uri="{FF2B5EF4-FFF2-40B4-BE49-F238E27FC236}">
+                    <a16:creationId xmlns:a16="http://schemas.microsoft.com/office/drawing/2014/main" id="{40D142AF-627E-1C48-93C1-C286E0264E86}"/>
+                  </a:ext>
+                </a:extLst>
+              </p:cNvPr>
+              <p:cNvSpPr txBox="1">
+                <a:spLocks noRot="1" noChangeAspect="1" noMove="1" noResize="1" noEditPoints="1" noAdjustHandles="1" noChangeArrowheads="1" noChangeShapeType="1" noTextEdit="1"/>
+              </p:cNvSpPr>
+              <p:nvPr/>
+            </p:nvSpPr>
+            <p:spPr>
+              <a:xfrm>
+                <a:off x="1975691" y="1339953"/>
+                <a:ext cx="220005" cy="246221"/>
+              </a:xfrm>
+              <a:prstGeom prst="rect">
+                <a:avLst/>
+              </a:prstGeom>
+              <a:blipFill>
+                <a:blip r:embed="rId4"/>
+                <a:stretch>
+                  <a:fillRect/>
+                </a:stretch>
+              </a:blipFill>
+            </p:spPr>
+            <p:txBody>
+              <a:bodyPr/>
+              <a:lstStyle/>
+              <a:p>
+                <a:r>
+                  <a:rPr lang="en-US">
+                    <a:noFill/>
+                  </a:rPr>
+                  <a:t> </a:t>
+                </a:r>
+              </a:p>
+            </p:txBody>
+          </p:sp>
+        </mc:Fallback>
+      </mc:AlternateContent>
       <p:sp>
         <p:nvSpPr>
-          <p:cNvPr id="141" name="TextBox 140">
+          <p:cNvPr id="147" name="Arc 146">
             <a:extLst>
               <a:ext uri="{FF2B5EF4-FFF2-40B4-BE49-F238E27FC236}">
-                <a16:creationId xmlns:a16="http://schemas.microsoft.com/office/drawing/2014/main" id="{9E645CF3-62A0-9E43-BFC3-09BBE364434A}"/>
+                <a16:creationId xmlns:a16="http://schemas.microsoft.com/office/drawing/2014/main" id="{51545862-56B0-8C4E-BC29-9EE65C77D3B3}"/>
+              </a:ext>
+            </a:extLst>
+          </p:cNvPr>
+          <p:cNvSpPr/>
+          <p:nvPr/>
+        </p:nvSpPr>
+        <p:spPr>
+          <a:xfrm rot="19556421">
+            <a:off x="1631574" y="1433768"/>
+            <a:ext cx="307510" cy="300915"/>
+          </a:xfrm>
+          <a:prstGeom prst="arc">
+            <a:avLst>
+              <a:gd name="adj1" fmla="val 591808"/>
+              <a:gd name="adj2" fmla="val 1954288"/>
+            </a:avLst>
+          </a:prstGeom>
+          <a:ln w="6350"/>
+        </p:spPr>
+        <p:style>
+          <a:lnRef idx="1">
+            <a:schemeClr val="dk1"/>
+          </a:lnRef>
+          <a:fillRef idx="0">
+            <a:schemeClr val="dk1"/>
+          </a:fillRef>
+          <a:effectRef idx="0">
+            <a:schemeClr val="dk1"/>
+          </a:effectRef>
+          <a:fontRef idx="minor">
+            <a:schemeClr val="tx1"/>
+          </a:fontRef>
+        </p:style>
+        <p:txBody>
+          <a:bodyPr rtlCol="0" anchor="ctr"/>
+          <a:lstStyle/>
+          <a:p>
+            <a:pPr algn="ctr"/>
+            <a:endParaRPr lang="en-US"/>
+          </a:p>
+        </p:txBody>
+      </p:sp>
+      <p:cxnSp>
+        <p:nvCxnSpPr>
+          <p:cNvPr id="148" name="Straight Connector 147">
+            <a:extLst>
+              <a:ext uri="{FF2B5EF4-FFF2-40B4-BE49-F238E27FC236}">
+                <a16:creationId xmlns:a16="http://schemas.microsoft.com/office/drawing/2014/main" id="{FE2D9910-D7C8-2E49-B48D-BBB206AF0A7E}"/>
+              </a:ext>
+            </a:extLst>
+          </p:cNvPr>
+          <p:cNvCxnSpPr>
+            <a:cxnSpLocks/>
+          </p:cNvCxnSpPr>
+          <p:nvPr/>
+        </p:nvCxnSpPr>
+        <p:spPr>
+          <a:xfrm flipV="1">
+            <a:off x="579984" y="1457939"/>
+            <a:ext cx="244680" cy="86215"/>
+          </a:xfrm>
+          <a:prstGeom prst="line">
+            <a:avLst/>
+          </a:prstGeom>
+          <a:ln w="6350"/>
+        </p:spPr>
+        <p:style>
+          <a:lnRef idx="1">
+            <a:schemeClr val="dk1"/>
+          </a:lnRef>
+          <a:fillRef idx="0">
+            <a:schemeClr val="dk1"/>
+          </a:fillRef>
+          <a:effectRef idx="0">
+            <a:schemeClr val="dk1"/>
+          </a:effectRef>
+          <a:fontRef idx="minor">
+            <a:schemeClr val="tx1"/>
+          </a:fontRef>
+        </p:style>
+      </p:cxnSp>
+      <p:cxnSp>
+        <p:nvCxnSpPr>
+          <p:cNvPr id="150" name="Straight Connector 149">
+            <a:extLst>
+              <a:ext uri="{FF2B5EF4-FFF2-40B4-BE49-F238E27FC236}">
+                <a16:creationId xmlns:a16="http://schemas.microsoft.com/office/drawing/2014/main" id="{ED7B39D4-03CF-5B47-9BB4-E1ACEAC17191}"/>
+              </a:ext>
+            </a:extLst>
+          </p:cNvPr>
+          <p:cNvCxnSpPr>
+            <a:cxnSpLocks/>
+          </p:cNvCxnSpPr>
+          <p:nvPr/>
+        </p:nvCxnSpPr>
+        <p:spPr>
+          <a:xfrm flipV="1">
+            <a:off x="579115" y="1544154"/>
+            <a:ext cx="266222" cy="2335"/>
+          </a:xfrm>
+          <a:prstGeom prst="line">
+            <a:avLst/>
+          </a:prstGeom>
+          <a:ln w="6350"/>
+        </p:spPr>
+        <p:style>
+          <a:lnRef idx="1">
+            <a:schemeClr val="dk1"/>
+          </a:lnRef>
+          <a:fillRef idx="0">
+            <a:schemeClr val="dk1"/>
+          </a:fillRef>
+          <a:effectRef idx="0">
+            <a:schemeClr val="dk1"/>
+          </a:effectRef>
+          <a:fontRef idx="minor">
+            <a:schemeClr val="tx1"/>
+          </a:fontRef>
+        </p:style>
+      </p:cxnSp>
+      <mc:AlternateContent xmlns:mc="http://schemas.openxmlformats.org/markup-compatibility/2006">
+        <mc:Choice xmlns:a14="http://schemas.microsoft.com/office/drawing/2010/main" Requires="a14">
+          <p:sp>
+            <p:nvSpPr>
+              <p:cNvPr id="151" name="TextBox 150">
+                <a:extLst>
+                  <a:ext uri="{FF2B5EF4-FFF2-40B4-BE49-F238E27FC236}">
+                    <a16:creationId xmlns:a16="http://schemas.microsoft.com/office/drawing/2014/main" id="{FD7E7A5F-D863-144C-A288-2CACC5CCEF87}"/>
+                  </a:ext>
+                </a:extLst>
+              </p:cNvPr>
+              <p:cNvSpPr txBox="1"/>
+              <p:nvPr/>
+            </p:nvSpPr>
+            <p:spPr>
+              <a:xfrm>
+                <a:off x="779771" y="1320225"/>
+                <a:ext cx="220005" cy="246221"/>
+              </a:xfrm>
+              <a:prstGeom prst="rect">
+                <a:avLst/>
+              </a:prstGeom>
+              <a:noFill/>
+            </p:spPr>
+            <p:txBody>
+              <a:bodyPr wrap="square" rtlCol="0">
+                <a:spAutoFit/>
+              </a:bodyPr>
+              <a:lstStyle/>
+              <a:p>
+                <a:pPr/>
+                <a14:m>
+                  <m:oMathPara xmlns:m="http://schemas.openxmlformats.org/officeDocument/2006/math">
+                    <m:oMathParaPr>
+                      <m:jc m:val="centerGroup"/>
+                    </m:oMathParaPr>
+                    <m:oMath xmlns:m="http://schemas.openxmlformats.org/officeDocument/2006/math">
+                      <m:r>
+                        <a:rPr lang="en-US" sz="1000" i="1" dirty="0" smtClean="0">
+                          <a:latin typeface="Cambria Math" panose="02040503050406030204" pitchFamily="18" charset="0"/>
+                          <a:ea typeface="Cambria Math" panose="02040503050406030204" pitchFamily="18" charset="0"/>
+                        </a:rPr>
+                        <m:t>𝜃</m:t>
+                      </m:r>
+                    </m:oMath>
+                  </m:oMathPara>
+                </a14:m>
+                <a:endParaRPr lang="en-US" sz="1000" i="1" dirty="0"/>
+              </a:p>
+            </p:txBody>
+          </p:sp>
+        </mc:Choice>
+        <mc:Fallback>
+          <p:sp>
+            <p:nvSpPr>
+              <p:cNvPr id="151" name="TextBox 150">
+                <a:extLst>
+                  <a:ext uri="{FF2B5EF4-FFF2-40B4-BE49-F238E27FC236}">
+                    <a16:creationId xmlns:a16="http://schemas.microsoft.com/office/drawing/2014/main" id="{FD7E7A5F-D863-144C-A288-2CACC5CCEF87}"/>
+                  </a:ext>
+                </a:extLst>
+              </p:cNvPr>
+              <p:cNvSpPr txBox="1">
+                <a:spLocks noRot="1" noChangeAspect="1" noMove="1" noResize="1" noEditPoints="1" noAdjustHandles="1" noChangeArrowheads="1" noChangeShapeType="1" noTextEdit="1"/>
+              </p:cNvSpPr>
+              <p:nvPr/>
+            </p:nvSpPr>
+            <p:spPr>
+              <a:xfrm>
+                <a:off x="779771" y="1320225"/>
+                <a:ext cx="220005" cy="246221"/>
+              </a:xfrm>
+              <a:prstGeom prst="rect">
+                <a:avLst/>
+              </a:prstGeom>
+              <a:blipFill>
+                <a:blip r:embed="rId5"/>
+                <a:stretch>
+                  <a:fillRect/>
+                </a:stretch>
+              </a:blipFill>
+            </p:spPr>
+            <p:txBody>
+              <a:bodyPr/>
+              <a:lstStyle/>
+              <a:p>
+                <a:r>
+                  <a:rPr lang="en-US">
+                    <a:noFill/>
+                  </a:rPr>
+                  <a:t> </a:t>
+                </a:r>
+              </a:p>
+            </p:txBody>
+          </p:sp>
+        </mc:Fallback>
+      </mc:AlternateContent>
+      <p:sp>
+        <p:nvSpPr>
+          <p:cNvPr id="152" name="Arc 151">
+            <a:extLst>
+              <a:ext uri="{FF2B5EF4-FFF2-40B4-BE49-F238E27FC236}">
+                <a16:creationId xmlns:a16="http://schemas.microsoft.com/office/drawing/2014/main" id="{019980E7-8C22-A749-95D1-7E8274CC3BD5}"/>
+              </a:ext>
+            </a:extLst>
+          </p:cNvPr>
+          <p:cNvSpPr/>
+          <p:nvPr/>
+        </p:nvSpPr>
+        <p:spPr>
+          <a:xfrm rot="19556421">
+            <a:off x="435654" y="1406868"/>
+            <a:ext cx="307510" cy="300915"/>
+          </a:xfrm>
+          <a:prstGeom prst="arc">
+            <a:avLst>
+              <a:gd name="adj1" fmla="val 591808"/>
+              <a:gd name="adj2" fmla="val 1954288"/>
+            </a:avLst>
+          </a:prstGeom>
+          <a:ln w="6350"/>
+        </p:spPr>
+        <p:style>
+          <a:lnRef idx="1">
+            <a:schemeClr val="dk1"/>
+          </a:lnRef>
+          <a:fillRef idx="0">
+            <a:schemeClr val="dk1"/>
+          </a:fillRef>
+          <a:effectRef idx="0">
+            <a:schemeClr val="dk1"/>
+          </a:effectRef>
+          <a:fontRef idx="minor">
+            <a:schemeClr val="tx1"/>
+          </a:fontRef>
+        </p:style>
+        <p:txBody>
+          <a:bodyPr rtlCol="0" anchor="ctr"/>
+          <a:lstStyle/>
+          <a:p>
+            <a:pPr algn="ctr"/>
+            <a:endParaRPr lang="en-US"/>
+          </a:p>
+        </p:txBody>
+      </p:sp>
+      <p:cxnSp>
+        <p:nvCxnSpPr>
+          <p:cNvPr id="154" name="Straight Connector 153">
+            <a:extLst>
+              <a:ext uri="{FF2B5EF4-FFF2-40B4-BE49-F238E27FC236}">
+                <a16:creationId xmlns:a16="http://schemas.microsoft.com/office/drawing/2014/main" id="{5CFF6B62-2304-8741-8772-5415975E9F2D}"/>
+              </a:ext>
+            </a:extLst>
+          </p:cNvPr>
+          <p:cNvCxnSpPr>
+            <a:cxnSpLocks/>
+          </p:cNvCxnSpPr>
+          <p:nvPr/>
+        </p:nvCxnSpPr>
+        <p:spPr>
+          <a:xfrm flipV="1">
+            <a:off x="2482605" y="1481122"/>
+            <a:ext cx="147831" cy="254185"/>
+          </a:xfrm>
+          <a:prstGeom prst="line">
+            <a:avLst/>
+          </a:prstGeom>
+          <a:ln w="6350"/>
+        </p:spPr>
+        <p:style>
+          <a:lnRef idx="1">
+            <a:schemeClr val="dk1"/>
+          </a:lnRef>
+          <a:fillRef idx="0">
+            <a:schemeClr val="dk1"/>
+          </a:fillRef>
+          <a:effectRef idx="0">
+            <a:schemeClr val="dk1"/>
+          </a:effectRef>
+          <a:fontRef idx="minor">
+            <a:schemeClr val="tx1"/>
+          </a:fontRef>
+        </p:style>
+      </p:cxnSp>
+      <p:cxnSp>
+        <p:nvCxnSpPr>
+          <p:cNvPr id="155" name="Straight Connector 154">
+            <a:extLst>
+              <a:ext uri="{FF2B5EF4-FFF2-40B4-BE49-F238E27FC236}">
+                <a16:creationId xmlns:a16="http://schemas.microsoft.com/office/drawing/2014/main" id="{4C38F392-EF75-F849-8E14-03281BBE4ABF}"/>
+              </a:ext>
+            </a:extLst>
+          </p:cNvPr>
+          <p:cNvCxnSpPr>
+            <a:cxnSpLocks/>
+          </p:cNvCxnSpPr>
+          <p:nvPr/>
+        </p:nvCxnSpPr>
+        <p:spPr>
+          <a:xfrm flipH="1" flipV="1">
+            <a:off x="2480279" y="1735304"/>
+            <a:ext cx="275882" cy="1"/>
+          </a:xfrm>
+          <a:prstGeom prst="line">
+            <a:avLst/>
+          </a:prstGeom>
+          <a:ln w="6350"/>
+        </p:spPr>
+        <p:style>
+          <a:lnRef idx="1">
+            <a:schemeClr val="dk1"/>
+          </a:lnRef>
+          <a:fillRef idx="0">
+            <a:schemeClr val="dk1"/>
+          </a:fillRef>
+          <a:effectRef idx="0">
+            <a:schemeClr val="dk1"/>
+          </a:effectRef>
+          <a:fontRef idx="minor">
+            <a:schemeClr val="tx1"/>
+          </a:fontRef>
+        </p:style>
+      </p:cxnSp>
+      <p:sp>
+        <p:nvSpPr>
+          <p:cNvPr id="156" name="TextBox 155">
+            <a:extLst>
+              <a:ext uri="{FF2B5EF4-FFF2-40B4-BE49-F238E27FC236}">
+                <a16:creationId xmlns:a16="http://schemas.microsoft.com/office/drawing/2014/main" id="{5BAFD67D-B949-444C-90E1-FA2D2ACCDF37}"/>
               </a:ext>
             </a:extLst>
           </p:cNvPr>
@@ -7687,16 +8105,14 @@
           <p:nvPr/>
         </p:nvSpPr>
         <p:spPr>
-          <a:xfrm rot="19994382" flipV="1">
-            <a:off x="2808483" y="1605808"/>
-            <a:ext cx="69017" cy="45719"/>
+          <a:xfrm>
+            <a:off x="2632739" y="1433845"/>
+            <a:ext cx="220005" cy="246221"/>
           </a:xfrm>
           <a:prstGeom prst="rect">
             <a:avLst/>
           </a:prstGeom>
-          <a:solidFill>
-            <a:srgbClr val="FF8080"/>
-          </a:solidFill>
+          <a:noFill/>
         </p:spPr>
         <p:txBody>
           <a:bodyPr wrap="square" rtlCol="0">
@@ -7704,7 +8120,219 @@
           </a:bodyPr>
           <a:lstStyle/>
           <a:p>
-            <a:endParaRPr lang="en-US" sz="1000" i="1" dirty="0"/>
+            <a:r>
+              <a:rPr lang="en-US" sz="1000" i="1" dirty="0"/>
+              <a:t>⍺</a:t>
+            </a:r>
+          </a:p>
+        </p:txBody>
+      </p:sp>
+      <p:sp>
+        <p:nvSpPr>
+          <p:cNvPr id="157" name="Arc 156">
+            <a:extLst>
+              <a:ext uri="{FF2B5EF4-FFF2-40B4-BE49-F238E27FC236}">
+                <a16:creationId xmlns:a16="http://schemas.microsoft.com/office/drawing/2014/main" id="{59929216-4935-6345-8C96-C1FAF19396C5}"/>
+              </a:ext>
+            </a:extLst>
+          </p:cNvPr>
+          <p:cNvSpPr/>
+          <p:nvPr/>
+        </p:nvSpPr>
+        <p:spPr>
+          <a:xfrm rot="19556421">
+            <a:off x="2360958" y="1569250"/>
+            <a:ext cx="307510" cy="300915"/>
+          </a:xfrm>
+          <a:prstGeom prst="arc">
+            <a:avLst>
+              <a:gd name="adj1" fmla="val 19640000"/>
+              <a:gd name="adj2" fmla="val 2397337"/>
+            </a:avLst>
+          </a:prstGeom>
+          <a:ln w="6350"/>
+        </p:spPr>
+        <p:style>
+          <a:lnRef idx="1">
+            <a:schemeClr val="dk1"/>
+          </a:lnRef>
+          <a:fillRef idx="0">
+            <a:schemeClr val="dk1"/>
+          </a:fillRef>
+          <a:effectRef idx="0">
+            <a:schemeClr val="dk1"/>
+          </a:effectRef>
+          <a:fontRef idx="minor">
+            <a:schemeClr val="tx1"/>
+          </a:fontRef>
+        </p:style>
+        <p:txBody>
+          <a:bodyPr rtlCol="0" anchor="ctr"/>
+          <a:lstStyle/>
+          <a:p>
+            <a:pPr algn="ctr"/>
+            <a:endParaRPr lang="en-US"/>
+          </a:p>
+        </p:txBody>
+      </p:sp>
+      <p:cxnSp>
+        <p:nvCxnSpPr>
+          <p:cNvPr id="158" name="Straight Connector 157">
+            <a:extLst>
+              <a:ext uri="{FF2B5EF4-FFF2-40B4-BE49-F238E27FC236}">
+                <a16:creationId xmlns:a16="http://schemas.microsoft.com/office/drawing/2014/main" id="{83F85067-557D-F049-961C-57B012A0DA6F}"/>
+              </a:ext>
+            </a:extLst>
+          </p:cNvPr>
+          <p:cNvCxnSpPr>
+            <a:cxnSpLocks/>
+          </p:cNvCxnSpPr>
+          <p:nvPr/>
+        </p:nvCxnSpPr>
+        <p:spPr>
+          <a:xfrm flipH="1" flipV="1">
+            <a:off x="3395230" y="1099556"/>
+            <a:ext cx="135224" cy="232985"/>
+          </a:xfrm>
+          <a:prstGeom prst="line">
+            <a:avLst/>
+          </a:prstGeom>
+          <a:ln w="6350"/>
+        </p:spPr>
+        <p:style>
+          <a:lnRef idx="1">
+            <a:schemeClr val="dk1"/>
+          </a:lnRef>
+          <a:fillRef idx="0">
+            <a:schemeClr val="dk1"/>
+          </a:fillRef>
+          <a:effectRef idx="0">
+            <a:schemeClr val="dk1"/>
+          </a:effectRef>
+          <a:fontRef idx="minor">
+            <a:schemeClr val="tx1"/>
+          </a:fontRef>
+        </p:style>
+      </p:cxnSp>
+      <p:cxnSp>
+        <p:nvCxnSpPr>
+          <p:cNvPr id="159" name="Straight Connector 158">
+            <a:extLst>
+              <a:ext uri="{FF2B5EF4-FFF2-40B4-BE49-F238E27FC236}">
+                <a16:creationId xmlns:a16="http://schemas.microsoft.com/office/drawing/2014/main" id="{91D04195-B0D9-304A-A9BA-ECD605295AA0}"/>
+              </a:ext>
+            </a:extLst>
+          </p:cNvPr>
+          <p:cNvCxnSpPr>
+            <a:cxnSpLocks/>
+          </p:cNvCxnSpPr>
+          <p:nvPr/>
+        </p:nvCxnSpPr>
+        <p:spPr>
+          <a:xfrm flipH="1" flipV="1">
+            <a:off x="3258655" y="1334181"/>
+            <a:ext cx="275882" cy="1"/>
+          </a:xfrm>
+          <a:prstGeom prst="line">
+            <a:avLst/>
+          </a:prstGeom>
+          <a:ln w="6350"/>
+        </p:spPr>
+        <p:style>
+          <a:lnRef idx="1">
+            <a:schemeClr val="dk1"/>
+          </a:lnRef>
+          <a:fillRef idx="0">
+            <a:schemeClr val="dk1"/>
+          </a:fillRef>
+          <a:effectRef idx="0">
+            <a:schemeClr val="dk1"/>
+          </a:effectRef>
+          <a:fontRef idx="minor">
+            <a:schemeClr val="tx1"/>
+          </a:fontRef>
+        </p:style>
+      </p:cxnSp>
+      <p:sp>
+        <p:nvSpPr>
+          <p:cNvPr id="160" name="Arc 159">
+            <a:extLst>
+              <a:ext uri="{FF2B5EF4-FFF2-40B4-BE49-F238E27FC236}">
+                <a16:creationId xmlns:a16="http://schemas.microsoft.com/office/drawing/2014/main" id="{540ACD8B-88A3-7F46-97BA-1A4AE7F73640}"/>
+              </a:ext>
+            </a:extLst>
+          </p:cNvPr>
+          <p:cNvSpPr/>
+          <p:nvPr/>
+        </p:nvSpPr>
+        <p:spPr>
+          <a:xfrm rot="19556421">
+            <a:off x="3375287" y="1178496"/>
+            <a:ext cx="307510" cy="300915"/>
+          </a:xfrm>
+          <a:prstGeom prst="arc">
+            <a:avLst>
+              <a:gd name="adj1" fmla="val 12713879"/>
+              <a:gd name="adj2" fmla="val 16367404"/>
+            </a:avLst>
+          </a:prstGeom>
+          <a:ln w="6350"/>
+        </p:spPr>
+        <p:style>
+          <a:lnRef idx="1">
+            <a:schemeClr val="dk1"/>
+          </a:lnRef>
+          <a:fillRef idx="0">
+            <a:schemeClr val="dk1"/>
+          </a:fillRef>
+          <a:effectRef idx="0">
+            <a:schemeClr val="dk1"/>
+          </a:effectRef>
+          <a:fontRef idx="minor">
+            <a:schemeClr val="tx1"/>
+          </a:fontRef>
+        </p:style>
+        <p:txBody>
+          <a:bodyPr rtlCol="0" anchor="ctr"/>
+          <a:lstStyle/>
+          <a:p>
+            <a:pPr algn="ctr"/>
+            <a:endParaRPr lang="en-US"/>
+          </a:p>
+        </p:txBody>
+      </p:sp>
+      <p:sp>
+        <p:nvSpPr>
+          <p:cNvPr id="161" name="TextBox 160">
+            <a:extLst>
+              <a:ext uri="{FF2B5EF4-FFF2-40B4-BE49-F238E27FC236}">
+                <a16:creationId xmlns:a16="http://schemas.microsoft.com/office/drawing/2014/main" id="{B4D6D943-1B93-4F4D-ABC4-4C14DB458523}"/>
+              </a:ext>
+            </a:extLst>
+          </p:cNvPr>
+          <p:cNvSpPr txBox="1"/>
+          <p:nvPr/>
+        </p:nvSpPr>
+        <p:spPr>
+          <a:xfrm>
+            <a:off x="3120068" y="1086319"/>
+            <a:ext cx="220005" cy="246221"/>
+          </a:xfrm>
+          <a:prstGeom prst="rect">
+            <a:avLst/>
+          </a:prstGeom>
+          <a:noFill/>
+        </p:spPr>
+        <p:txBody>
+          <a:bodyPr wrap="square" rtlCol="0">
+            <a:spAutoFit/>
+          </a:bodyPr>
+          <a:lstStyle/>
+          <a:p>
+            <a:r>
+              <a:rPr lang="en-US" sz="1000" i="1" dirty="0"/>
+              <a:t>⍺</a:t>
+            </a:r>
           </a:p>
         </p:txBody>
       </p:sp>

</xml_diff>

<commit_message>
updated the first 2 images
</commit_message>
<xml_diff>
--- a/ICRA19/pictures/pdf/Angle.pptx
+++ b/ICRA19/pictures/pdf/Angle.pptx
@@ -243,7 +243,7 @@
           <a:p>
             <a:fld id="{9578BA41-4624-3049-9962-89A9624110BB}" type="datetimeFigureOut">
               <a:rPr lang="en-US" smtClean="0"/>
-              <a:t>9/10/18</a:t>
+              <a:t>9/14/18</a:t>
             </a:fld>
             <a:endParaRPr lang="en-US"/>
           </a:p>
@@ -413,7 +413,7 @@
           <a:p>
             <a:fld id="{9578BA41-4624-3049-9962-89A9624110BB}" type="datetimeFigureOut">
               <a:rPr lang="en-US" smtClean="0"/>
-              <a:t>9/10/18</a:t>
+              <a:t>9/14/18</a:t>
             </a:fld>
             <a:endParaRPr lang="en-US"/>
           </a:p>
@@ -593,7 +593,7 @@
           <a:p>
             <a:fld id="{9578BA41-4624-3049-9962-89A9624110BB}" type="datetimeFigureOut">
               <a:rPr lang="en-US" smtClean="0"/>
-              <a:t>9/10/18</a:t>
+              <a:t>9/14/18</a:t>
             </a:fld>
             <a:endParaRPr lang="en-US"/>
           </a:p>
@@ -763,7 +763,7 @@
           <a:p>
             <a:fld id="{9578BA41-4624-3049-9962-89A9624110BB}" type="datetimeFigureOut">
               <a:rPr lang="en-US" smtClean="0"/>
-              <a:t>9/10/18</a:t>
+              <a:t>9/14/18</a:t>
             </a:fld>
             <a:endParaRPr lang="en-US"/>
           </a:p>
@@ -1009,7 +1009,7 @@
           <a:p>
             <a:fld id="{9578BA41-4624-3049-9962-89A9624110BB}" type="datetimeFigureOut">
               <a:rPr lang="en-US" smtClean="0"/>
-              <a:t>9/10/18</a:t>
+              <a:t>9/14/18</a:t>
             </a:fld>
             <a:endParaRPr lang="en-US"/>
           </a:p>
@@ -1241,7 +1241,7 @@
           <a:p>
             <a:fld id="{9578BA41-4624-3049-9962-89A9624110BB}" type="datetimeFigureOut">
               <a:rPr lang="en-US" smtClean="0"/>
-              <a:t>9/10/18</a:t>
+              <a:t>9/14/18</a:t>
             </a:fld>
             <a:endParaRPr lang="en-US"/>
           </a:p>
@@ -1608,7 +1608,7 @@
           <a:p>
             <a:fld id="{9578BA41-4624-3049-9962-89A9624110BB}" type="datetimeFigureOut">
               <a:rPr lang="en-US" smtClean="0"/>
-              <a:t>9/10/18</a:t>
+              <a:t>9/14/18</a:t>
             </a:fld>
             <a:endParaRPr lang="en-US"/>
           </a:p>
@@ -1726,7 +1726,7 @@
           <a:p>
             <a:fld id="{9578BA41-4624-3049-9962-89A9624110BB}" type="datetimeFigureOut">
               <a:rPr lang="en-US" smtClean="0"/>
-              <a:t>9/10/18</a:t>
+              <a:t>9/14/18</a:t>
             </a:fld>
             <a:endParaRPr lang="en-US"/>
           </a:p>
@@ -1821,7 +1821,7 @@
           <a:p>
             <a:fld id="{9578BA41-4624-3049-9962-89A9624110BB}" type="datetimeFigureOut">
               <a:rPr lang="en-US" smtClean="0"/>
-              <a:t>9/10/18</a:t>
+              <a:t>9/14/18</a:t>
             </a:fld>
             <a:endParaRPr lang="en-US"/>
           </a:p>
@@ -2098,7 +2098,7 @@
           <a:p>
             <a:fld id="{9578BA41-4624-3049-9962-89A9624110BB}" type="datetimeFigureOut">
               <a:rPr lang="en-US" smtClean="0"/>
-              <a:t>9/10/18</a:t>
+              <a:t>9/14/18</a:t>
             </a:fld>
             <a:endParaRPr lang="en-US"/>
           </a:p>
@@ -2355,7 +2355,7 @@
           <a:p>
             <a:fld id="{9578BA41-4624-3049-9962-89A9624110BB}" type="datetimeFigureOut">
               <a:rPr lang="en-US" smtClean="0"/>
-              <a:t>9/10/18</a:t>
+              <a:t>9/14/18</a:t>
             </a:fld>
             <a:endParaRPr lang="en-US"/>
           </a:p>
@@ -2568,7 +2568,7 @@
           <a:p>
             <a:fld id="{9578BA41-4624-3049-9962-89A9624110BB}" type="datetimeFigureOut">
               <a:rPr lang="en-US" smtClean="0"/>
-              <a:t>9/10/18</a:t>
+              <a:t>9/14/18</a:t>
             </a:fld>
             <a:endParaRPr lang="en-US"/>
           </a:p>
@@ -7265,7 +7265,7 @@
             </p:nvSpPr>
             <p:spPr>
               <a:xfrm>
-                <a:off x="3196689" y="1352634"/>
+                <a:off x="3196609" y="1401886"/>
                 <a:ext cx="220005" cy="246221"/>
               </a:xfrm>
               <a:prstGeom prst="rect">
@@ -7318,7 +7318,7 @@
             </p:nvSpPr>
             <p:spPr>
               <a:xfrm>
-                <a:off x="3196689" y="1352634"/>
+                <a:off x="3196609" y="1401886"/>
                 <a:ext cx="220005" cy="246221"/>
               </a:xfrm>
               <a:prstGeom prst="rect">
@@ -7408,8 +7408,8 @@
         </p:nvSpPr>
         <p:spPr>
           <a:xfrm>
-            <a:off x="1204592" y="917542"/>
-            <a:ext cx="640557" cy="184666"/>
+            <a:off x="923975" y="917542"/>
+            <a:ext cx="877718" cy="230832"/>
           </a:xfrm>
           <a:prstGeom prst="rect">
             <a:avLst/>
@@ -7426,7 +7426,7 @@
           <a:p>
             <a:pPr algn="ctr"/>
             <a:r>
-              <a:rPr lang="en-US" sz="600" dirty="0">
+              <a:rPr lang="en-US" sz="900" dirty="0">
                 <a:solidFill>
                   <a:schemeClr val="accent1"/>
                 </a:solidFill>
@@ -7496,8 +7496,8 @@
         </p:nvSpPr>
         <p:spPr>
           <a:xfrm>
-            <a:off x="1081675" y="1140627"/>
-            <a:ext cx="640557" cy="184666"/>
+            <a:off x="1042201" y="1126941"/>
+            <a:ext cx="640557" cy="230832"/>
           </a:xfrm>
           <a:prstGeom prst="rect">
             <a:avLst/>
@@ -7512,7 +7512,7 @@
           <a:p>
             <a:pPr algn="ctr"/>
             <a:r>
-              <a:rPr lang="en-US" sz="600" dirty="0">
+              <a:rPr lang="en-US" sz="900" dirty="0">
                 <a:solidFill>
                   <a:schemeClr val="accent1"/>
                 </a:solidFill>
@@ -7662,7 +7662,7 @@
             </p:nvSpPr>
             <p:spPr>
               <a:xfrm>
-                <a:off x="1975691" y="1339953"/>
+                <a:off x="1977102" y="1408421"/>
                 <a:ext cx="220005" cy="246221"/>
               </a:xfrm>
               <a:prstGeom prst="rect">
@@ -7715,14 +7715,14 @@
             </p:nvSpPr>
             <p:spPr>
               <a:xfrm>
-                <a:off x="1975691" y="1339953"/>
+                <a:off x="1977102" y="1408421"/>
                 <a:ext cx="220005" cy="246221"/>
               </a:xfrm>
               <a:prstGeom prst="rect">
                 <a:avLst/>
               </a:prstGeom>
               <a:blipFill>
-                <a:blip r:embed="rId4"/>
+                <a:blip r:embed="rId5"/>
                 <a:stretch>
                   <a:fillRect/>
                 </a:stretch>
@@ -7807,7 +7807,7 @@
         </p:nvCxnSpPr>
         <p:spPr>
           <a:xfrm flipV="1">
-            <a:off x="579984" y="1457939"/>
+            <a:off x="569898" y="1461301"/>
             <a:ext cx="244680" cy="86215"/>
           </a:xfrm>
           <a:prstGeom prst="line">
@@ -7846,7 +7846,7 @@
         </p:nvCxnSpPr>
         <p:spPr>
           <a:xfrm flipV="1">
-            <a:off x="579115" y="1544154"/>
+            <a:off x="569029" y="1547516"/>
             <a:ext cx="266222" cy="2335"/>
           </a:xfrm>
           <a:prstGeom prst="line">
@@ -7885,7 +7885,7 @@
             </p:nvSpPr>
             <p:spPr>
               <a:xfrm>
-                <a:off x="779771" y="1320225"/>
+                <a:off x="775331" y="1378405"/>
                 <a:ext cx="220005" cy="246221"/>
               </a:xfrm>
               <a:prstGeom prst="rect">
@@ -7938,14 +7938,14 @@
             </p:nvSpPr>
             <p:spPr>
               <a:xfrm>
-                <a:off x="779771" y="1320225"/>
+                <a:off x="775331" y="1378405"/>
                 <a:ext cx="220005" cy="246221"/>
               </a:xfrm>
               <a:prstGeom prst="rect">
                 <a:avLst/>
               </a:prstGeom>
               <a:blipFill>
-                <a:blip r:embed="rId5"/>
+                <a:blip r:embed="rId6"/>
                 <a:stretch>
                   <a:fillRect/>
                 </a:stretch>
@@ -8333,6 +8333,576 @@
               <a:rPr lang="en-US" sz="1000" i="1" dirty="0"/>
               <a:t>⍺</a:t>
             </a:r>
+          </a:p>
+        </p:txBody>
+      </p:sp>
+      <p:cxnSp>
+        <p:nvCxnSpPr>
+          <p:cNvPr id="138" name="Straight Arrow Connector 137">
+            <a:extLst>
+              <a:ext uri="{FF2B5EF4-FFF2-40B4-BE49-F238E27FC236}">
+                <a16:creationId xmlns:a16="http://schemas.microsoft.com/office/drawing/2014/main" id="{3E9C20D4-7212-E840-BFE1-B833252A4E9C}"/>
+              </a:ext>
+            </a:extLst>
+          </p:cNvPr>
+          <p:cNvCxnSpPr>
+            <a:cxnSpLocks/>
+          </p:cNvCxnSpPr>
+          <p:nvPr/>
+        </p:nvCxnSpPr>
+        <p:spPr>
+          <a:xfrm>
+            <a:off x="1774667" y="1581189"/>
+            <a:ext cx="0" cy="193302"/>
+          </a:xfrm>
+          <a:prstGeom prst="straightConnector1">
+            <a:avLst/>
+          </a:prstGeom>
+          <a:ln w="12700">
+            <a:solidFill>
+              <a:schemeClr val="accent1"/>
+            </a:solidFill>
+            <a:headEnd type="none"/>
+            <a:tailEnd type="stealth" w="med" len="lg"/>
+          </a:ln>
+        </p:spPr>
+        <p:style>
+          <a:lnRef idx="1">
+            <a:schemeClr val="dk1"/>
+          </a:lnRef>
+          <a:fillRef idx="0">
+            <a:schemeClr val="dk1"/>
+          </a:fillRef>
+          <a:effectRef idx="0">
+            <a:schemeClr val="dk1"/>
+          </a:effectRef>
+          <a:fontRef idx="minor">
+            <a:schemeClr val="tx1"/>
+          </a:fontRef>
+        </p:style>
+      </p:cxnSp>
+      <p:sp>
+        <p:nvSpPr>
+          <p:cNvPr id="141" name="Arc 140">
+            <a:extLst>
+              <a:ext uri="{FF2B5EF4-FFF2-40B4-BE49-F238E27FC236}">
+                <a16:creationId xmlns:a16="http://schemas.microsoft.com/office/drawing/2014/main" id="{002C5357-AC04-6249-8C72-748CF92FC643}"/>
+              </a:ext>
+            </a:extLst>
+          </p:cNvPr>
+          <p:cNvSpPr/>
+          <p:nvPr/>
+        </p:nvSpPr>
+        <p:spPr>
+          <a:xfrm rot="19556421">
+            <a:off x="1656742" y="1461703"/>
+            <a:ext cx="233893" cy="228877"/>
+          </a:xfrm>
+          <a:prstGeom prst="arc">
+            <a:avLst>
+              <a:gd name="adj1" fmla="val 629955"/>
+              <a:gd name="adj2" fmla="val 7432647"/>
+            </a:avLst>
+          </a:prstGeom>
+          <a:ln w="6350"/>
+        </p:spPr>
+        <p:style>
+          <a:lnRef idx="1">
+            <a:schemeClr val="dk1"/>
+          </a:lnRef>
+          <a:fillRef idx="0">
+            <a:schemeClr val="dk1"/>
+          </a:fillRef>
+          <a:effectRef idx="0">
+            <a:schemeClr val="dk1"/>
+          </a:effectRef>
+          <a:fontRef idx="minor">
+            <a:schemeClr val="tx1"/>
+          </a:fontRef>
+        </p:style>
+        <p:txBody>
+          <a:bodyPr rtlCol="0" anchor="ctr"/>
+          <a:lstStyle/>
+          <a:p>
+            <a:pPr algn="ctr"/>
+            <a:endParaRPr lang="en-US"/>
+          </a:p>
+        </p:txBody>
+      </p:sp>
+      <mc:AlternateContent xmlns:mc="http://schemas.openxmlformats.org/markup-compatibility/2006">
+        <mc:Choice xmlns:a14="http://schemas.microsoft.com/office/drawing/2010/main" Requires="a14">
+          <p:sp>
+            <p:nvSpPr>
+              <p:cNvPr id="162" name="TextBox 161">
+                <a:extLst>
+                  <a:ext uri="{FF2B5EF4-FFF2-40B4-BE49-F238E27FC236}">
+                    <a16:creationId xmlns:a16="http://schemas.microsoft.com/office/drawing/2014/main" id="{20A3EE2C-8161-A24D-96AD-DFB8828C21E8}"/>
+                  </a:ext>
+                </a:extLst>
+              </p:cNvPr>
+              <p:cNvSpPr txBox="1"/>
+              <p:nvPr/>
+            </p:nvSpPr>
+            <p:spPr>
+              <a:xfrm>
+                <a:off x="1785203" y="1574640"/>
+                <a:ext cx="220005" cy="246221"/>
+              </a:xfrm>
+              <a:prstGeom prst="rect">
+                <a:avLst/>
+              </a:prstGeom>
+              <a:noFill/>
+            </p:spPr>
+            <p:txBody>
+              <a:bodyPr wrap="square" rtlCol="0">
+                <a:spAutoFit/>
+              </a:bodyPr>
+              <a:lstStyle/>
+              <a:p>
+                <a:pPr/>
+                <a14:m>
+                  <m:oMathPara xmlns:m="http://schemas.openxmlformats.org/officeDocument/2006/math">
+                    <m:oMathParaPr>
+                      <m:jc m:val="centerGroup"/>
+                    </m:oMathParaPr>
+                    <m:oMath xmlns:m="http://schemas.openxmlformats.org/officeDocument/2006/math">
+                      <m:r>
+                        <a:rPr lang="en-US" sz="1000" i="1" dirty="0" smtClean="0">
+                          <a:latin typeface="Cambria Math" panose="02040503050406030204" pitchFamily="18" charset="0"/>
+                          <a:ea typeface="Cambria Math" panose="02040503050406030204" pitchFamily="18" charset="0"/>
+                        </a:rPr>
+                        <m:t>𝛽</m:t>
+                      </m:r>
+                    </m:oMath>
+                  </m:oMathPara>
+                </a14:m>
+                <a:endParaRPr lang="en-US" sz="1000" i="1" dirty="0"/>
+              </a:p>
+            </p:txBody>
+          </p:sp>
+        </mc:Choice>
+        <mc:Fallback>
+          <p:sp>
+            <p:nvSpPr>
+              <p:cNvPr id="162" name="TextBox 161">
+                <a:extLst>
+                  <a:ext uri="{FF2B5EF4-FFF2-40B4-BE49-F238E27FC236}">
+                    <a16:creationId xmlns:a16="http://schemas.microsoft.com/office/drawing/2014/main" id="{20A3EE2C-8161-A24D-96AD-DFB8828C21E8}"/>
+                  </a:ext>
+                </a:extLst>
+              </p:cNvPr>
+              <p:cNvSpPr txBox="1">
+                <a:spLocks noRot="1" noChangeAspect="1" noMove="1" noResize="1" noEditPoints="1" noAdjustHandles="1" noChangeArrowheads="1" noChangeShapeType="1" noTextEdit="1"/>
+              </p:cNvSpPr>
+              <p:nvPr/>
+            </p:nvSpPr>
+            <p:spPr>
+              <a:xfrm>
+                <a:off x="1785203" y="1574640"/>
+                <a:ext cx="220005" cy="246221"/>
+              </a:xfrm>
+              <a:prstGeom prst="rect">
+                <a:avLst/>
+              </a:prstGeom>
+              <a:blipFill>
+                <a:blip r:embed="rId7"/>
+                <a:stretch>
+                  <a:fillRect/>
+                </a:stretch>
+              </a:blipFill>
+            </p:spPr>
+            <p:txBody>
+              <a:bodyPr/>
+              <a:lstStyle/>
+              <a:p>
+                <a:r>
+                  <a:rPr lang="en-US">
+                    <a:noFill/>
+                  </a:rPr>
+                  <a:t> </a:t>
+                </a:r>
+              </a:p>
+            </p:txBody>
+          </p:sp>
+        </mc:Fallback>
+      </mc:AlternateContent>
+      <mc:AlternateContent xmlns:mc="http://schemas.openxmlformats.org/markup-compatibility/2006">
+        <mc:Choice xmlns:a14="http://schemas.microsoft.com/office/drawing/2010/main" Requires="a14">
+          <p:sp>
+            <p:nvSpPr>
+              <p:cNvPr id="163" name="TextBox 162">
+                <a:extLst>
+                  <a:ext uri="{FF2B5EF4-FFF2-40B4-BE49-F238E27FC236}">
+                    <a16:creationId xmlns:a16="http://schemas.microsoft.com/office/drawing/2014/main" id="{3FFAE395-51D4-B54F-80B6-FBAD16EE8A9A}"/>
+                  </a:ext>
+                </a:extLst>
+              </p:cNvPr>
+              <p:cNvSpPr txBox="1"/>
+              <p:nvPr/>
+            </p:nvSpPr>
+            <p:spPr>
+              <a:xfrm>
+                <a:off x="3049926" y="1586835"/>
+                <a:ext cx="220005" cy="246221"/>
+              </a:xfrm>
+              <a:prstGeom prst="rect">
+                <a:avLst/>
+              </a:prstGeom>
+              <a:noFill/>
+            </p:spPr>
+            <p:txBody>
+              <a:bodyPr wrap="square" rtlCol="0">
+                <a:spAutoFit/>
+              </a:bodyPr>
+              <a:lstStyle/>
+              <a:p>
+                <a:pPr/>
+                <a14:m>
+                  <m:oMathPara xmlns:m="http://schemas.openxmlformats.org/officeDocument/2006/math">
+                    <m:oMathParaPr>
+                      <m:jc m:val="centerGroup"/>
+                    </m:oMathParaPr>
+                    <m:oMath xmlns:m="http://schemas.openxmlformats.org/officeDocument/2006/math">
+                      <m:r>
+                        <a:rPr lang="en-US" sz="1000" i="1" dirty="0" smtClean="0">
+                          <a:latin typeface="Cambria Math" panose="02040503050406030204" pitchFamily="18" charset="0"/>
+                          <a:ea typeface="Cambria Math" panose="02040503050406030204" pitchFamily="18" charset="0"/>
+                        </a:rPr>
+                        <m:t>𝛽</m:t>
+                      </m:r>
+                    </m:oMath>
+                  </m:oMathPara>
+                </a14:m>
+                <a:endParaRPr lang="en-US" sz="1000" i="1" dirty="0"/>
+              </a:p>
+            </p:txBody>
+          </p:sp>
+        </mc:Choice>
+        <mc:Fallback>
+          <p:sp>
+            <p:nvSpPr>
+              <p:cNvPr id="163" name="TextBox 162">
+                <a:extLst>
+                  <a:ext uri="{FF2B5EF4-FFF2-40B4-BE49-F238E27FC236}">
+                    <a16:creationId xmlns:a16="http://schemas.microsoft.com/office/drawing/2014/main" id="{3FFAE395-51D4-B54F-80B6-FBAD16EE8A9A}"/>
+                  </a:ext>
+                </a:extLst>
+              </p:cNvPr>
+              <p:cNvSpPr txBox="1">
+                <a:spLocks noRot="1" noChangeAspect="1" noMove="1" noResize="1" noEditPoints="1" noAdjustHandles="1" noChangeArrowheads="1" noChangeShapeType="1" noTextEdit="1"/>
+              </p:cNvSpPr>
+              <p:nvPr/>
+            </p:nvSpPr>
+            <p:spPr>
+              <a:xfrm>
+                <a:off x="3049926" y="1586835"/>
+                <a:ext cx="220005" cy="246221"/>
+              </a:xfrm>
+              <a:prstGeom prst="rect">
+                <a:avLst/>
+              </a:prstGeom>
+              <a:blipFill>
+                <a:blip r:embed="rId8"/>
+                <a:stretch>
+                  <a:fillRect r="-5882"/>
+                </a:stretch>
+              </a:blipFill>
+            </p:spPr>
+            <p:txBody>
+              <a:bodyPr/>
+              <a:lstStyle/>
+              <a:p>
+                <a:r>
+                  <a:rPr lang="en-US">
+                    <a:noFill/>
+                  </a:rPr>
+                  <a:t> </a:t>
+                </a:r>
+              </a:p>
+            </p:txBody>
+          </p:sp>
+        </mc:Fallback>
+      </mc:AlternateContent>
+      <mc:AlternateContent xmlns:mc="http://schemas.openxmlformats.org/markup-compatibility/2006">
+        <mc:Choice xmlns:a14="http://schemas.microsoft.com/office/drawing/2010/main" Requires="a14">
+          <p:sp>
+            <p:nvSpPr>
+              <p:cNvPr id="164" name="TextBox 163">
+                <a:extLst>
+                  <a:ext uri="{FF2B5EF4-FFF2-40B4-BE49-F238E27FC236}">
+                    <a16:creationId xmlns:a16="http://schemas.microsoft.com/office/drawing/2014/main" id="{4F9E93B7-3BA5-1D48-AA61-B8E613A93BDE}"/>
+                  </a:ext>
+                </a:extLst>
+              </p:cNvPr>
+              <p:cNvSpPr txBox="1"/>
+              <p:nvPr/>
+            </p:nvSpPr>
+            <p:spPr>
+              <a:xfrm>
+                <a:off x="610325" y="1568495"/>
+                <a:ext cx="220005" cy="246221"/>
+              </a:xfrm>
+              <a:prstGeom prst="rect">
+                <a:avLst/>
+              </a:prstGeom>
+              <a:noFill/>
+            </p:spPr>
+            <p:txBody>
+              <a:bodyPr wrap="square" rtlCol="0">
+                <a:spAutoFit/>
+              </a:bodyPr>
+              <a:lstStyle/>
+              <a:p>
+                <a:pPr/>
+                <a14:m>
+                  <m:oMathPara xmlns:m="http://schemas.openxmlformats.org/officeDocument/2006/math">
+                    <m:oMathParaPr>
+                      <m:jc m:val="centerGroup"/>
+                    </m:oMathParaPr>
+                    <m:oMath xmlns:m="http://schemas.openxmlformats.org/officeDocument/2006/math">
+                      <m:r>
+                        <a:rPr lang="en-US" sz="1000" i="1" dirty="0" smtClean="0">
+                          <a:latin typeface="Cambria Math" panose="02040503050406030204" pitchFamily="18" charset="0"/>
+                          <a:ea typeface="Cambria Math" panose="02040503050406030204" pitchFamily="18" charset="0"/>
+                        </a:rPr>
+                        <m:t>𝛽</m:t>
+                      </m:r>
+                    </m:oMath>
+                  </m:oMathPara>
+                </a14:m>
+                <a:endParaRPr lang="en-US" sz="1000" i="1" dirty="0"/>
+              </a:p>
+            </p:txBody>
+          </p:sp>
+        </mc:Choice>
+        <mc:Fallback>
+          <p:sp>
+            <p:nvSpPr>
+              <p:cNvPr id="164" name="TextBox 163">
+                <a:extLst>
+                  <a:ext uri="{FF2B5EF4-FFF2-40B4-BE49-F238E27FC236}">
+                    <a16:creationId xmlns:a16="http://schemas.microsoft.com/office/drawing/2014/main" id="{4F9E93B7-3BA5-1D48-AA61-B8E613A93BDE}"/>
+                  </a:ext>
+                </a:extLst>
+              </p:cNvPr>
+              <p:cNvSpPr txBox="1">
+                <a:spLocks noRot="1" noChangeAspect="1" noMove="1" noResize="1" noEditPoints="1" noAdjustHandles="1" noChangeArrowheads="1" noChangeShapeType="1" noTextEdit="1"/>
+              </p:cNvSpPr>
+              <p:nvPr/>
+            </p:nvSpPr>
+            <p:spPr>
+              <a:xfrm>
+                <a:off x="610325" y="1568495"/>
+                <a:ext cx="220005" cy="246221"/>
+              </a:xfrm>
+              <a:prstGeom prst="rect">
+                <a:avLst/>
+              </a:prstGeom>
+              <a:blipFill>
+                <a:blip r:embed="rId9"/>
+                <a:stretch>
+                  <a:fillRect/>
+                </a:stretch>
+              </a:blipFill>
+            </p:spPr>
+            <p:txBody>
+              <a:bodyPr/>
+              <a:lstStyle/>
+              <a:p>
+                <a:r>
+                  <a:rPr lang="en-US">
+                    <a:noFill/>
+                  </a:rPr>
+                  <a:t> </a:t>
+                </a:r>
+              </a:p>
+            </p:txBody>
+          </p:sp>
+        </mc:Fallback>
+      </mc:AlternateContent>
+      <p:cxnSp>
+        <p:nvCxnSpPr>
+          <p:cNvPr id="165" name="Straight Arrow Connector 164">
+            <a:extLst>
+              <a:ext uri="{FF2B5EF4-FFF2-40B4-BE49-F238E27FC236}">
+                <a16:creationId xmlns:a16="http://schemas.microsoft.com/office/drawing/2014/main" id="{9186AF87-C2D3-BB4D-AB82-2DDAFA1C1FA5}"/>
+              </a:ext>
+            </a:extLst>
+          </p:cNvPr>
+          <p:cNvCxnSpPr>
+            <a:cxnSpLocks/>
+          </p:cNvCxnSpPr>
+          <p:nvPr/>
+        </p:nvCxnSpPr>
+        <p:spPr>
+          <a:xfrm>
+            <a:off x="571137" y="1556955"/>
+            <a:ext cx="0" cy="193302"/>
+          </a:xfrm>
+          <a:prstGeom prst="straightConnector1">
+            <a:avLst/>
+          </a:prstGeom>
+          <a:ln w="12700">
+            <a:solidFill>
+              <a:schemeClr val="accent1"/>
+            </a:solidFill>
+            <a:headEnd type="none"/>
+            <a:tailEnd type="stealth" w="med" len="lg"/>
+          </a:ln>
+        </p:spPr>
+        <p:style>
+          <a:lnRef idx="1">
+            <a:schemeClr val="dk1"/>
+          </a:lnRef>
+          <a:fillRef idx="0">
+            <a:schemeClr val="dk1"/>
+          </a:fillRef>
+          <a:effectRef idx="0">
+            <a:schemeClr val="dk1"/>
+          </a:effectRef>
+          <a:fontRef idx="minor">
+            <a:schemeClr val="tx1"/>
+          </a:fontRef>
+        </p:style>
+      </p:cxnSp>
+      <p:cxnSp>
+        <p:nvCxnSpPr>
+          <p:cNvPr id="166" name="Straight Arrow Connector 165">
+            <a:extLst>
+              <a:ext uri="{FF2B5EF4-FFF2-40B4-BE49-F238E27FC236}">
+                <a16:creationId xmlns:a16="http://schemas.microsoft.com/office/drawing/2014/main" id="{8FE53F21-DA81-7D4D-8743-3D78C9AA3379}"/>
+              </a:ext>
+            </a:extLst>
+          </p:cNvPr>
+          <p:cNvCxnSpPr>
+            <a:cxnSpLocks/>
+          </p:cNvCxnSpPr>
+          <p:nvPr/>
+        </p:nvCxnSpPr>
+        <p:spPr>
+          <a:xfrm>
+            <a:off x="3010388" y="1581189"/>
+            <a:ext cx="0" cy="193302"/>
+          </a:xfrm>
+          <a:prstGeom prst="straightConnector1">
+            <a:avLst/>
+          </a:prstGeom>
+          <a:ln w="12700">
+            <a:solidFill>
+              <a:schemeClr val="accent1"/>
+            </a:solidFill>
+            <a:headEnd type="none"/>
+            <a:tailEnd type="stealth" w="med" len="lg"/>
+          </a:ln>
+        </p:spPr>
+        <p:style>
+          <a:lnRef idx="1">
+            <a:schemeClr val="dk1"/>
+          </a:lnRef>
+          <a:fillRef idx="0">
+            <a:schemeClr val="dk1"/>
+          </a:fillRef>
+          <a:effectRef idx="0">
+            <a:schemeClr val="dk1"/>
+          </a:effectRef>
+          <a:fontRef idx="minor">
+            <a:schemeClr val="tx1"/>
+          </a:fontRef>
+        </p:style>
+      </p:cxnSp>
+      <p:sp>
+        <p:nvSpPr>
+          <p:cNvPr id="167" name="Arc 166">
+            <a:extLst>
+              <a:ext uri="{FF2B5EF4-FFF2-40B4-BE49-F238E27FC236}">
+                <a16:creationId xmlns:a16="http://schemas.microsoft.com/office/drawing/2014/main" id="{3AD170E2-8C23-C241-A588-C44D4DF476EC}"/>
+              </a:ext>
+            </a:extLst>
+          </p:cNvPr>
+          <p:cNvSpPr/>
+          <p:nvPr/>
+        </p:nvSpPr>
+        <p:spPr>
+          <a:xfrm rot="19556421">
+            <a:off x="2889394" y="1465977"/>
+            <a:ext cx="233893" cy="228877"/>
+          </a:xfrm>
+          <a:prstGeom prst="arc">
+            <a:avLst>
+              <a:gd name="adj1" fmla="val 779413"/>
+              <a:gd name="adj2" fmla="val 7432647"/>
+            </a:avLst>
+          </a:prstGeom>
+          <a:ln w="6350"/>
+        </p:spPr>
+        <p:style>
+          <a:lnRef idx="1">
+            <a:schemeClr val="dk1"/>
+          </a:lnRef>
+          <a:fillRef idx="0">
+            <a:schemeClr val="dk1"/>
+          </a:fillRef>
+          <a:effectRef idx="0">
+            <a:schemeClr val="dk1"/>
+          </a:effectRef>
+          <a:fontRef idx="minor">
+            <a:schemeClr val="tx1"/>
+          </a:fontRef>
+        </p:style>
+        <p:txBody>
+          <a:bodyPr rtlCol="0" anchor="ctr"/>
+          <a:lstStyle/>
+          <a:p>
+            <a:pPr algn="ctr"/>
+            <a:endParaRPr lang="en-US"/>
+          </a:p>
+        </p:txBody>
+      </p:sp>
+      <p:sp>
+        <p:nvSpPr>
+          <p:cNvPr id="168" name="Arc 167">
+            <a:extLst>
+              <a:ext uri="{FF2B5EF4-FFF2-40B4-BE49-F238E27FC236}">
+                <a16:creationId xmlns:a16="http://schemas.microsoft.com/office/drawing/2014/main" id="{E4F56070-323F-2C4C-A644-17FF25D6E051}"/>
+              </a:ext>
+            </a:extLst>
+          </p:cNvPr>
+          <p:cNvSpPr/>
+          <p:nvPr/>
+        </p:nvSpPr>
+        <p:spPr>
+          <a:xfrm rot="19556421">
+            <a:off x="448584" y="1428641"/>
+            <a:ext cx="233893" cy="228877"/>
+          </a:xfrm>
+          <a:prstGeom prst="arc">
+            <a:avLst>
+              <a:gd name="adj1" fmla="val 977770"/>
+              <a:gd name="adj2" fmla="val 7432647"/>
+            </a:avLst>
+          </a:prstGeom>
+          <a:ln w="6350"/>
+        </p:spPr>
+        <p:style>
+          <a:lnRef idx="1">
+            <a:schemeClr val="dk1"/>
+          </a:lnRef>
+          <a:fillRef idx="0">
+            <a:schemeClr val="dk1"/>
+          </a:fillRef>
+          <a:effectRef idx="0">
+            <a:schemeClr val="dk1"/>
+          </a:effectRef>
+          <a:fontRef idx="minor">
+            <a:schemeClr val="tx1"/>
+          </a:fontRef>
+        </p:style>
+        <p:txBody>
+          <a:bodyPr rtlCol="0" anchor="ctr"/>
+          <a:lstStyle/>
+          <a:p>
+            <a:pPr algn="ctr"/>
+            <a:endParaRPr lang="en-US"/>
           </a:p>
         </p:txBody>
       </p:sp>

</xml_diff>